<commit_message>
secondary commit after upload error
</commit_message>
<xml_diff>
--- a/Movie Studio Feasibility.pptx
+++ b/Movie Studio Feasibility.pptx
@@ -1207,7 +1207,7 @@
           </a:r>
           <a:r>
             <a:rPr lang="en-US" b="0" i="0" dirty="0"/>
-            <a:t>/rating</a:t>
+            <a:t>/rating?</a:t>
           </a:r>
         </a:p>
         <a:p>
@@ -1951,7 +1951,7 @@
           </a:r>
           <a:r>
             <a:rPr lang="en-US" sz="1100" b="0" i="0" kern="1200" dirty="0"/>
-            <a:t>/rating</a:t>
+            <a:t>/rating?</a:t>
           </a:r>
         </a:p>
         <a:p>
@@ -7256,7 +7256,7 @@
             <p:ph idx="1"/>
             <p:extLst>
               <p:ext uri="{D42A27DB-BD31-4B8C-83A1-F6EECF244321}">
-                <p14:modId xmlns:p14="http://schemas.microsoft.com/office/powerpoint/2010/main" val="1760053132"/>
+                <p14:modId xmlns:p14="http://schemas.microsoft.com/office/powerpoint/2010/main" val="4039869645"/>
               </p:ext>
             </p:extLst>
           </p:nvPr>
@@ -8008,7 +8008,7 @@
                   <a:srgbClr val="FFFFFF"/>
                 </a:solidFill>
               </a:rPr>
-              <a:t>-To our question 3, Budget has a .22 correlation coefficient with average rating - not above our usual threshold of .6, but not insignificant either.</a:t>
+              <a:t>-To our question 3, Budget has a .22 correlation coefficient with average rating - not above our usual threshold of 0.6, but not insignificant either.</a:t>
             </a:r>
           </a:p>
           <a:p>
@@ -8035,10 +8035,10 @@
       </p:sp>
       <p:pic>
         <p:nvPicPr>
-          <p:cNvPr id="1026" name="Picture 2">
+          <p:cNvPr id="3" name="Picture 2">
             <a:extLst>
               <a:ext uri="{FF2B5EF4-FFF2-40B4-BE49-F238E27FC236}">
-                <a16:creationId xmlns:a16="http://schemas.microsoft.com/office/drawing/2014/main" id="{5D70C56F-ACE0-4705-80B3-398E68B2242B}"/>
+                <a16:creationId xmlns:a16="http://schemas.microsoft.com/office/drawing/2014/main" id="{B4E0C411-CA39-4564-B0A3-756C59B64F31}"/>
               </a:ext>
             </a:extLst>
           </p:cNvPr>
@@ -8055,14 +8055,15 @@
               </a:ext>
             </a:extLst>
           </a:blip>
+          <a:srcRect/>
           <a:stretch>
             <a:fillRect/>
           </a:stretch>
         </p:blipFill>
         <p:spPr bwMode="auto">
           <a:xfrm>
-            <a:off x="4875482" y="294945"/>
-            <a:ext cx="6268110" cy="6268110"/>
+            <a:off x="4477667" y="0"/>
+            <a:ext cx="6858000" cy="6858000"/>
           </a:xfrm>
           <a:prstGeom prst="rect">
             <a:avLst/>
@@ -8349,10 +8350,10 @@
       </p:sp>
       <p:pic>
         <p:nvPicPr>
-          <p:cNvPr id="3084" name="Picture 12">
+          <p:cNvPr id="3074" name="Picture 2">
             <a:extLst>
               <a:ext uri="{FF2B5EF4-FFF2-40B4-BE49-F238E27FC236}">
-                <a16:creationId xmlns:a16="http://schemas.microsoft.com/office/drawing/2014/main" id="{6BC44EA1-DC22-48C5-BA53-C1304D669434}"/>
+                <a16:creationId xmlns:a16="http://schemas.microsoft.com/office/drawing/2014/main" id="{2370D60B-5FD6-444D-8D5E-4074C1725BC7}"/>
               </a:ext>
             </a:extLst>
           </p:cNvPr>
@@ -8376,8 +8377,8 @@
         </p:blipFill>
         <p:spPr bwMode="auto">
           <a:xfrm>
-            <a:off x="8175577" y="3482678"/>
-            <a:ext cx="4016408" cy="3375322"/>
+            <a:off x="4054729" y="0"/>
+            <a:ext cx="4124931" cy="3483434"/>
           </a:xfrm>
           <a:prstGeom prst="rect">
             <a:avLst/>
@@ -8396,10 +8397,10 @@
       </p:pic>
       <p:pic>
         <p:nvPicPr>
-          <p:cNvPr id="3086" name="Picture 14">
+          <p:cNvPr id="3076" name="Picture 4">
             <a:extLst>
               <a:ext uri="{FF2B5EF4-FFF2-40B4-BE49-F238E27FC236}">
-                <a16:creationId xmlns:a16="http://schemas.microsoft.com/office/drawing/2014/main" id="{F1F5E650-B90E-4851-B1E0-DC9F3B8C480F}"/>
+                <a16:creationId xmlns:a16="http://schemas.microsoft.com/office/drawing/2014/main" id="{3F3F9F55-3D8B-4B83-83C0-6CC6B96EB168}"/>
               </a:ext>
             </a:extLst>
           </p:cNvPr>
@@ -8423,8 +8424,8 @@
         </p:blipFill>
         <p:spPr bwMode="auto">
           <a:xfrm>
-            <a:off x="4056515" y="7958"/>
-            <a:ext cx="3957239" cy="3446985"/>
+            <a:off x="8181446" y="0"/>
+            <a:ext cx="4016408" cy="3479923"/>
           </a:xfrm>
           <a:prstGeom prst="rect">
             <a:avLst/>
@@ -8443,10 +8444,10 @@
       </p:pic>
       <p:pic>
         <p:nvPicPr>
-          <p:cNvPr id="3088" name="Picture 16">
+          <p:cNvPr id="3078" name="Picture 6">
             <a:extLst>
               <a:ext uri="{FF2B5EF4-FFF2-40B4-BE49-F238E27FC236}">
-                <a16:creationId xmlns:a16="http://schemas.microsoft.com/office/drawing/2014/main" id="{D13AF42F-A031-4656-A763-4EAF96EEA18D}"/>
+                <a16:creationId xmlns:a16="http://schemas.microsoft.com/office/drawing/2014/main" id="{9D8E43E8-CA66-4752-B5A0-4745B1038ED4}"/>
               </a:ext>
             </a:extLst>
           </p:cNvPr>
@@ -8470,8 +8471,8 @@
         </p:blipFill>
         <p:spPr bwMode="auto">
           <a:xfrm>
-            <a:off x="8013753" y="-7957"/>
-            <a:ext cx="4180033" cy="3482678"/>
+            <a:off x="4052943" y="3483386"/>
+            <a:ext cx="4116780" cy="3374614"/>
           </a:xfrm>
           <a:prstGeom prst="rect">
             <a:avLst/>
@@ -8490,10 +8491,10 @@
       </p:pic>
       <p:pic>
         <p:nvPicPr>
-          <p:cNvPr id="3090" name="Picture 18">
+          <p:cNvPr id="3080" name="Picture 8">
             <a:extLst>
               <a:ext uri="{FF2B5EF4-FFF2-40B4-BE49-F238E27FC236}">
-                <a16:creationId xmlns:a16="http://schemas.microsoft.com/office/drawing/2014/main" id="{02EA7A9A-B149-4DDF-B08E-2320EE97FCC5}"/>
+                <a16:creationId xmlns:a16="http://schemas.microsoft.com/office/drawing/2014/main" id="{10320F4C-1549-47D9-8EEC-D4C48FD40417}"/>
               </a:ext>
             </a:extLst>
           </p:cNvPr>
@@ -8517,8 +8518,8 @@
         </p:blipFill>
         <p:spPr bwMode="auto">
           <a:xfrm>
-            <a:off x="4056515" y="3482678"/>
-            <a:ext cx="4117276" cy="3375322"/>
+            <a:off x="8179660" y="3481654"/>
+            <a:ext cx="4019980" cy="3378077"/>
           </a:xfrm>
           <a:prstGeom prst="rect">
             <a:avLst/>
@@ -8798,10 +8799,10 @@
       </p:sp>
       <p:pic>
         <p:nvPicPr>
-          <p:cNvPr id="2068" name="Picture 20">
+          <p:cNvPr id="2050" name="Picture 2">
             <a:extLst>
               <a:ext uri="{FF2B5EF4-FFF2-40B4-BE49-F238E27FC236}">
-                <a16:creationId xmlns:a16="http://schemas.microsoft.com/office/drawing/2014/main" id="{8A335018-0DC0-457C-8A9E-2D14B446ECBA}"/>
+                <a16:creationId xmlns:a16="http://schemas.microsoft.com/office/drawing/2014/main" id="{DA05D97A-3154-48F4-8BAA-9E4FAD8F2757}"/>
               </a:ext>
             </a:extLst>
           </p:cNvPr>
@@ -8825,8 +8826,8 @@
         </p:blipFill>
         <p:spPr bwMode="auto">
           <a:xfrm>
-            <a:off x="4059924" y="0"/>
-            <a:ext cx="4021571" cy="3383275"/>
+            <a:off x="4059924" y="-8989"/>
+            <a:ext cx="4051447" cy="3437686"/>
           </a:xfrm>
           <a:prstGeom prst="rect">
             <a:avLst/>
@@ -8845,10 +8846,10 @@
       </p:pic>
       <p:pic>
         <p:nvPicPr>
-          <p:cNvPr id="4" name="Picture 22">
+          <p:cNvPr id="2052" name="Picture 4">
             <a:extLst>
               <a:ext uri="{FF2B5EF4-FFF2-40B4-BE49-F238E27FC236}">
-                <a16:creationId xmlns:a16="http://schemas.microsoft.com/office/drawing/2014/main" id="{9559C349-2BC5-468B-B9EA-3A4A17EF919C}"/>
+                <a16:creationId xmlns:a16="http://schemas.microsoft.com/office/drawing/2014/main" id="{9548EE95-AA0E-444B-ADA4-969F478D5D90}"/>
               </a:ext>
             </a:extLst>
           </p:cNvPr>
@@ -8872,8 +8873,8 @@
         </p:blipFill>
         <p:spPr bwMode="auto">
           <a:xfrm>
-            <a:off x="8161967" y="0"/>
-            <a:ext cx="4021571" cy="3401252"/>
+            <a:off x="8161967" y="8989"/>
+            <a:ext cx="4030018" cy="3409231"/>
           </a:xfrm>
           <a:prstGeom prst="rect">
             <a:avLst/>
@@ -8892,10 +8893,10 @@
       </p:pic>
       <p:pic>
         <p:nvPicPr>
-          <p:cNvPr id="2072" name="Picture 24">
+          <p:cNvPr id="2058" name="Picture 10">
             <a:extLst>
               <a:ext uri="{FF2B5EF4-FFF2-40B4-BE49-F238E27FC236}">
-                <a16:creationId xmlns:a16="http://schemas.microsoft.com/office/drawing/2014/main" id="{8112C45E-BC93-4A5E-BB83-CE2FB20D18A4}"/>
+                <a16:creationId xmlns:a16="http://schemas.microsoft.com/office/drawing/2014/main" id="{5575E862-762D-4B16-AA11-FCE551B9F0A2}"/>
               </a:ext>
             </a:extLst>
           </p:cNvPr>
@@ -8919,8 +8920,8 @@
         </p:blipFill>
         <p:spPr bwMode="auto">
           <a:xfrm>
-            <a:off x="4059924" y="3419329"/>
-            <a:ext cx="4021571" cy="3429750"/>
+            <a:off x="4059924" y="3428250"/>
+            <a:ext cx="4051447" cy="3429750"/>
           </a:xfrm>
           <a:prstGeom prst="rect">
             <a:avLst/>
@@ -8939,10 +8940,10 @@
       </p:pic>
       <p:pic>
         <p:nvPicPr>
-          <p:cNvPr id="2074" name="Picture 26">
+          <p:cNvPr id="2060" name="Picture 12">
             <a:extLst>
               <a:ext uri="{FF2B5EF4-FFF2-40B4-BE49-F238E27FC236}">
-                <a16:creationId xmlns:a16="http://schemas.microsoft.com/office/drawing/2014/main" id="{6E782706-72E8-43D8-BFA8-1804FE1FBC4C}"/>
+                <a16:creationId xmlns:a16="http://schemas.microsoft.com/office/drawing/2014/main" id="{71D71F00-F9B4-4488-9D03-13B3FB7BB711}"/>
               </a:ext>
             </a:extLst>
           </p:cNvPr>
@@ -8966,8 +8967,8 @@
         </p:blipFill>
         <p:spPr bwMode="auto">
           <a:xfrm>
-            <a:off x="8161967" y="3392264"/>
-            <a:ext cx="3979437" cy="3474725"/>
+            <a:off x="8161967" y="3418220"/>
+            <a:ext cx="4030033" cy="3461341"/>
           </a:xfrm>
           <a:prstGeom prst="rect">
             <a:avLst/>
@@ -9045,7 +9046,27 @@
                 <a:effectLst/>
                 <a:latin typeface="Helvetica Neue"/>
               </a:rPr>
-              <a:t>Do films with certain ratings (G-PG-R) tend to have better Critical Rating? (question 5)</a:t>
+              <a:t>Do films with certain ratings (</a:t>
+            </a:r>
+            <a:r>
+              <a:rPr lang="en-US" b="0" i="0" dirty="0" err="1">
+                <a:solidFill>
+                  <a:schemeClr val="bg1"/>
+                </a:solidFill>
+                <a:effectLst/>
+                <a:latin typeface="Helvetica Neue"/>
+              </a:rPr>
+              <a:t>ie</a:t>
+            </a:r>
+            <a:r>
+              <a:rPr lang="en-US" b="0" i="0" dirty="0">
+                <a:solidFill>
+                  <a:schemeClr val="bg1"/>
+                </a:solidFill>
+                <a:effectLst/>
+                <a:latin typeface="Helvetica Neue"/>
+              </a:rPr>
+              <a:t>. G-PG-R) tend to have better Critical Rating? (question 5)</a:t>
             </a:r>
             <a:endParaRPr lang="en-US" dirty="0">
               <a:solidFill>
@@ -9823,7 +9844,7 @@
           <a:p>
             <a:r>
               <a:rPr lang="en-US" dirty="0"/>
-              <a:t>2) Critical Reception and Return-On-Investment are not well correlated.  Having both metrics as goals is desirable, but performing well in one does not automatically lead to the other.</a:t>
+              <a:t>2) Critical Reception and Return-On-Investment are not well correlated.  Having both metrics as goals is desirable; performing well in one does not automatically lead to the other.</a:t>
             </a:r>
           </a:p>
           <a:p>
@@ -9841,7 +9862,7 @@
           <a:p>
             <a:r>
               <a:rPr lang="en-US" dirty="0"/>
-              <a:t>5) G-Rated films tend to achieve good critical reviews – though this may be driven by BV/Disney, and may be difficult to duplicate. Avoid PG-13 films.</a:t>
+              <a:t>5) G-Rated films tend to achieve good critical reviews – though this may be driven by BV/Disney, thus may be difficult to duplicate. Avoid PG-13 films.</a:t>
             </a:r>
           </a:p>
           <a:p>
@@ -10518,16 +10539,16 @@
 <file path=customXml/itemProps2.xml><?xml version="1.0" encoding="utf-8"?>
 <ds:datastoreItem xmlns:ds="http://schemas.openxmlformats.org/officeDocument/2006/customXml" ds:itemID="{8F3CD65D-61A5-43C9-A837-6EC73C7DA8AB}">
   <ds:schemaRefs>
+    <ds:schemaRef ds:uri="16c05727-aa75-4e4a-9b5f-8a80a1165891"/>
+    <ds:schemaRef ds:uri="http://purl.org/dc/elements/1.1/"/>
+    <ds:schemaRef ds:uri="http://schemas.microsoft.com/office/infopath/2007/PartnerControls"/>
+    <ds:schemaRef ds:uri="http://schemas.microsoft.com/office/2006/metadata/properties"/>
     <ds:schemaRef ds:uri="http://purl.org/dc/terms/"/>
-    <ds:schemaRef ds:uri="http://schemas.microsoft.com/office/2006/metadata/properties"/>
-    <ds:schemaRef ds:uri="http://purl.org/dc/dcmitype/"/>
     <ds:schemaRef ds:uri="http://schemas.microsoft.com/office/2006/documentManagement/types"/>
-    <ds:schemaRef ds:uri="http://purl.org/dc/elements/1.1/"/>
-    <ds:schemaRef ds:uri="16c05727-aa75-4e4a-9b5f-8a80a1165891"/>
-    <ds:schemaRef ds:uri="http://www.w3.org/XML/1998/namespace"/>
-    <ds:schemaRef ds:uri="http://schemas.microsoft.com/office/infopath/2007/PartnerControls"/>
     <ds:schemaRef ds:uri="http://schemas.openxmlformats.org/package/2006/metadata/core-properties"/>
     <ds:schemaRef ds:uri="71af3243-3dd4-4a8d-8c0d-dd76da1f02a5"/>
+    <ds:schemaRef ds:uri="http://www.w3.org/XML/1998/namespace"/>
+    <ds:schemaRef ds:uri="http://purl.org/dc/dcmitype/"/>
   </ds:schemaRefs>
 </ds:datastoreItem>
 </file>

</xml_diff>